<commit_message>
change Edge size and create repeat bracket, repeat number.
</commit_message>
<xml_diff>
--- a/DrawrINGS画像.pptx
+++ b/DrawrINGS画像.pptx
@@ -5212,383 +5212,404 @@
           </a:prstGeom>
         </p:spPr>
       </p:pic>
-      <p:cxnSp>
-        <p:nvCxnSpPr>
-          <p:cNvPr id="15" name="直線コネクタ 14">
-            <a:extLst>
-              <a:ext uri="{FF2B5EF4-FFF2-40B4-BE49-F238E27FC236}">
-                <a16:creationId xmlns:a16="http://schemas.microsoft.com/office/drawing/2014/main" id="{EADA564B-6221-9044-9F0C-39F98B287850}"/>
-              </a:ext>
-            </a:extLst>
-          </p:cNvPr>
-          <p:cNvCxnSpPr>
-            <a:stCxn id="9" idx="6"/>
-            <a:endCxn id="10" idx="1"/>
-          </p:cNvCxnSpPr>
+      <p:grpSp>
+        <p:nvGrpSpPr>
+          <p:cNvPr id="33" name="グループ化 32">
+            <a:extLst>
+              <a:ext uri="{FF2B5EF4-FFF2-40B4-BE49-F238E27FC236}">
+                <a16:creationId xmlns:a16="http://schemas.microsoft.com/office/drawing/2014/main" id="{C2D66458-0AAC-6F4F-86A1-FAECA59080C1}"/>
+              </a:ext>
+            </a:extLst>
+          </p:cNvPr>
+          <p:cNvGrpSpPr/>
           <p:nvPr/>
-        </p:nvCxnSpPr>
-        <p:spPr>
-          <a:xfrm>
-            <a:off x="2235574" y="595858"/>
-            <a:ext cx="146866" cy="0"/>
-          </a:xfrm>
-          <a:prstGeom prst="line">
-            <a:avLst/>
-          </a:prstGeom>
-          <a:ln w="38100"/>
-        </p:spPr>
-        <p:style>
-          <a:lnRef idx="1">
-            <a:schemeClr val="accent1"/>
-          </a:lnRef>
-          <a:fillRef idx="0">
-            <a:schemeClr val="accent1"/>
-          </a:fillRef>
-          <a:effectRef idx="0">
-            <a:schemeClr val="accent1"/>
-          </a:effectRef>
-          <a:fontRef idx="minor">
-            <a:schemeClr val="tx1"/>
-          </a:fontRef>
-        </p:style>
-      </p:cxnSp>
-      <p:sp>
-        <p:nvSpPr>
-          <p:cNvPr id="9" name="円/楕円 8">
-            <a:extLst>
-              <a:ext uri="{FF2B5EF4-FFF2-40B4-BE49-F238E27FC236}">
-                <a16:creationId xmlns:a16="http://schemas.microsoft.com/office/drawing/2014/main" id="{E86F5014-7781-9248-9A33-B2BD7A3799BB}"/>
-              </a:ext>
-            </a:extLst>
-          </p:cNvPr>
-          <p:cNvSpPr/>
-          <p:nvPr/>
-        </p:nvSpPr>
-        <p:spPr>
-          <a:xfrm>
-            <a:off x="2065607" y="504043"/>
-            <a:ext cx="169967" cy="183629"/>
-          </a:xfrm>
-          <a:prstGeom prst="ellipse">
-            <a:avLst/>
-          </a:prstGeom>
-          <a:solidFill>
-            <a:srgbClr val="FFFF00"/>
-          </a:solidFill>
-          <a:ln>
-            <a:solidFill>
-              <a:schemeClr val="tx1"/>
-            </a:solidFill>
-          </a:ln>
-        </p:spPr>
-        <p:style>
-          <a:lnRef idx="2">
-            <a:schemeClr val="accent1">
-              <a:shade val="50000"/>
-            </a:schemeClr>
-          </a:lnRef>
-          <a:fillRef idx="1">
-            <a:schemeClr val="accent1"/>
-          </a:fillRef>
-          <a:effectRef idx="0">
-            <a:schemeClr val="accent1"/>
-          </a:effectRef>
-          <a:fontRef idx="minor">
-            <a:schemeClr val="lt1"/>
-          </a:fontRef>
-        </p:style>
-        <p:txBody>
-          <a:bodyPr rtlCol="0" anchor="ctr"/>
-          <a:lstStyle/>
-          <a:p>
-            <a:pPr algn="ctr"/>
-            <a:endParaRPr kumimoji="1" lang="ja-JP" altLang="en-US"/>
-          </a:p>
-        </p:txBody>
-      </p:sp>
-      <p:sp>
-        <p:nvSpPr>
-          <p:cNvPr id="10" name="正方形/長方形 9">
-            <a:extLst>
-              <a:ext uri="{FF2B5EF4-FFF2-40B4-BE49-F238E27FC236}">
-                <a16:creationId xmlns:a16="http://schemas.microsoft.com/office/drawing/2014/main" id="{2BFFECFC-5765-0745-8303-A82F4C53E4D9}"/>
-              </a:ext>
-            </a:extLst>
-          </p:cNvPr>
-          <p:cNvSpPr/>
-          <p:nvPr/>
-        </p:nvSpPr>
-        <p:spPr>
-          <a:xfrm>
-            <a:off x="2382440" y="504043"/>
-            <a:ext cx="183600" cy="183629"/>
-          </a:xfrm>
-          <a:prstGeom prst="rect">
-            <a:avLst/>
-          </a:prstGeom>
-          <a:ln>
-            <a:solidFill>
-              <a:schemeClr val="tx1"/>
-            </a:solidFill>
-          </a:ln>
-        </p:spPr>
-        <p:style>
-          <a:lnRef idx="2">
-            <a:schemeClr val="accent1">
-              <a:shade val="50000"/>
-            </a:schemeClr>
-          </a:lnRef>
-          <a:fillRef idx="1">
-            <a:schemeClr val="accent1"/>
-          </a:fillRef>
-          <a:effectRef idx="0">
-            <a:schemeClr val="accent1"/>
-          </a:effectRef>
-          <a:fontRef idx="minor">
-            <a:schemeClr val="lt1"/>
-          </a:fontRef>
-        </p:style>
-        <p:txBody>
-          <a:bodyPr rtlCol="0" anchor="ctr"/>
-          <a:lstStyle/>
-          <a:p>
-            <a:pPr algn="ctr"/>
-            <a:endParaRPr kumimoji="1" lang="ja-JP" altLang="en-US"/>
-          </a:p>
-        </p:txBody>
-      </p:sp>
-      <p:cxnSp>
-        <p:nvCxnSpPr>
-          <p:cNvPr id="21" name="直線コネクタ 20">
-            <a:extLst>
-              <a:ext uri="{FF2B5EF4-FFF2-40B4-BE49-F238E27FC236}">
-                <a16:creationId xmlns:a16="http://schemas.microsoft.com/office/drawing/2014/main" id="{19E0ACDD-D4B1-9542-9F64-2F0582D96388}"/>
-              </a:ext>
-            </a:extLst>
-          </p:cNvPr>
-          <p:cNvCxnSpPr>
-            <a:cxnSpLocks/>
-            <a:stCxn id="10" idx="3"/>
-            <a:endCxn id="8" idx="3"/>
-          </p:cNvCxnSpPr>
-          <p:nvPr/>
-        </p:nvCxnSpPr>
-        <p:spPr>
-          <a:xfrm>
-            <a:off x="2566040" y="595858"/>
-            <a:ext cx="202301" cy="1"/>
-          </a:xfrm>
-          <a:prstGeom prst="line">
-            <a:avLst/>
-          </a:prstGeom>
-          <a:ln w="38100"/>
-        </p:spPr>
-        <p:style>
-          <a:lnRef idx="1">
-            <a:schemeClr val="accent1"/>
-          </a:lnRef>
-          <a:fillRef idx="0">
-            <a:schemeClr val="accent1"/>
-          </a:fillRef>
-          <a:effectRef idx="0">
-            <a:schemeClr val="accent1"/>
-          </a:effectRef>
-          <a:fontRef idx="minor">
-            <a:schemeClr val="tx1"/>
-          </a:fontRef>
-        </p:style>
-      </p:cxnSp>
-      <p:cxnSp>
-        <p:nvCxnSpPr>
-          <p:cNvPr id="27" name="直線コネクタ 26">
-            <a:extLst>
-              <a:ext uri="{FF2B5EF4-FFF2-40B4-BE49-F238E27FC236}">
-                <a16:creationId xmlns:a16="http://schemas.microsoft.com/office/drawing/2014/main" id="{54771145-7F67-064C-BC42-D7E84155F8E7}"/>
-              </a:ext>
-            </a:extLst>
-          </p:cNvPr>
-          <p:cNvCxnSpPr>
-            <a:cxnSpLocks/>
-            <a:stCxn id="8" idx="1"/>
-            <a:endCxn id="9" idx="2"/>
-          </p:cNvCxnSpPr>
-          <p:nvPr/>
-        </p:nvCxnSpPr>
-        <p:spPr>
-          <a:xfrm flipV="1">
-            <a:off x="1918741" y="595858"/>
-            <a:ext cx="146866" cy="1"/>
-          </a:xfrm>
-          <a:prstGeom prst="line">
-            <a:avLst/>
-          </a:prstGeom>
-          <a:ln w="38100"/>
-        </p:spPr>
-        <p:style>
-          <a:lnRef idx="1">
-            <a:schemeClr val="accent1"/>
-          </a:lnRef>
-          <a:fillRef idx="0">
-            <a:schemeClr val="accent1"/>
-          </a:fillRef>
-          <a:effectRef idx="0">
-            <a:schemeClr val="accent1"/>
-          </a:effectRef>
-          <a:fontRef idx="minor">
-            <a:schemeClr val="tx1"/>
-          </a:fontRef>
-        </p:style>
-      </p:cxnSp>
-      <p:sp>
-        <p:nvSpPr>
-          <p:cNvPr id="8" name="角丸四角形 7">
-            <a:extLst>
-              <a:ext uri="{FF2B5EF4-FFF2-40B4-BE49-F238E27FC236}">
-                <a16:creationId xmlns:a16="http://schemas.microsoft.com/office/drawing/2014/main" id="{B82D2604-25F7-2F40-95E7-BCD2463F163E}"/>
-              </a:ext>
-            </a:extLst>
-          </p:cNvPr>
-          <p:cNvSpPr/>
-          <p:nvPr/>
-        </p:nvSpPr>
-        <p:spPr>
+        </p:nvGrpSpPr>
+        <p:grpSpPr>
           <a:xfrm>
             <a:off x="1918741" y="367259"/>
             <a:ext cx="849600" cy="457200"/>
+            <a:chOff x="1918741" y="367259"/>
+            <a:chExt cx="849600" cy="457200"/>
           </a:xfrm>
-          <a:prstGeom prst="roundRect">
-            <a:avLst/>
-          </a:prstGeom>
-          <a:noFill/>
-          <a:ln w="3175">
+        </p:grpSpPr>
+        <p:cxnSp>
+          <p:nvCxnSpPr>
+            <p:cNvPr id="15" name="直線コネクタ 14">
+              <a:extLst>
+                <a:ext uri="{FF2B5EF4-FFF2-40B4-BE49-F238E27FC236}">
+                  <a16:creationId xmlns:a16="http://schemas.microsoft.com/office/drawing/2014/main" id="{EADA564B-6221-9044-9F0C-39F98B287850}"/>
+                </a:ext>
+              </a:extLst>
+            </p:cNvPr>
+            <p:cNvCxnSpPr>
+              <a:stCxn id="9" idx="6"/>
+              <a:endCxn id="10" idx="1"/>
+            </p:cNvCxnSpPr>
+            <p:nvPr/>
+          </p:nvCxnSpPr>
+          <p:spPr>
+            <a:xfrm>
+              <a:off x="2235574" y="595858"/>
+              <a:ext cx="146866" cy="0"/>
+            </a:xfrm>
+            <a:prstGeom prst="line">
+              <a:avLst/>
+            </a:prstGeom>
+            <a:ln w="38100"/>
+          </p:spPr>
+          <p:style>
+            <a:lnRef idx="1">
+              <a:schemeClr val="accent1"/>
+            </a:lnRef>
+            <a:fillRef idx="0">
+              <a:schemeClr val="accent1"/>
+            </a:fillRef>
+            <a:effectRef idx="0">
+              <a:schemeClr val="accent1"/>
+            </a:effectRef>
+            <a:fontRef idx="minor">
+              <a:schemeClr val="tx1"/>
+            </a:fontRef>
+          </p:style>
+        </p:cxnSp>
+        <p:cxnSp>
+          <p:nvCxnSpPr>
+            <p:cNvPr id="21" name="直線コネクタ 20">
+              <a:extLst>
+                <a:ext uri="{FF2B5EF4-FFF2-40B4-BE49-F238E27FC236}">
+                  <a16:creationId xmlns:a16="http://schemas.microsoft.com/office/drawing/2014/main" id="{19E0ACDD-D4B1-9542-9F64-2F0582D96388}"/>
+                </a:ext>
+              </a:extLst>
+            </p:cNvPr>
+            <p:cNvCxnSpPr>
+              <a:cxnSpLocks/>
+              <a:stCxn id="10" idx="3"/>
+              <a:endCxn id="8" idx="3"/>
+            </p:cNvCxnSpPr>
+            <p:nvPr/>
+          </p:nvCxnSpPr>
+          <p:spPr>
+            <a:xfrm>
+              <a:off x="2566040" y="595858"/>
+              <a:ext cx="202301" cy="1"/>
+            </a:xfrm>
+            <a:prstGeom prst="line">
+              <a:avLst/>
+            </a:prstGeom>
+            <a:ln w="38100"/>
+          </p:spPr>
+          <p:style>
+            <a:lnRef idx="1">
+              <a:schemeClr val="accent1"/>
+            </a:lnRef>
+            <a:fillRef idx="0">
+              <a:schemeClr val="accent1"/>
+            </a:fillRef>
+            <a:effectRef idx="0">
+              <a:schemeClr val="accent1"/>
+            </a:effectRef>
+            <a:fontRef idx="minor">
+              <a:schemeClr val="tx1"/>
+            </a:fontRef>
+          </p:style>
+        </p:cxnSp>
+        <p:cxnSp>
+          <p:nvCxnSpPr>
+            <p:cNvPr id="27" name="直線コネクタ 26">
+              <a:extLst>
+                <a:ext uri="{FF2B5EF4-FFF2-40B4-BE49-F238E27FC236}">
+                  <a16:creationId xmlns:a16="http://schemas.microsoft.com/office/drawing/2014/main" id="{54771145-7F67-064C-BC42-D7E84155F8E7}"/>
+                </a:ext>
+              </a:extLst>
+            </p:cNvPr>
+            <p:cNvCxnSpPr>
+              <a:cxnSpLocks/>
+              <a:stCxn id="8" idx="1"/>
+              <a:endCxn id="9" idx="2"/>
+            </p:cNvCxnSpPr>
+            <p:nvPr/>
+          </p:nvCxnSpPr>
+          <p:spPr>
+            <a:xfrm flipV="1">
+              <a:off x="1918741" y="595858"/>
+              <a:ext cx="146866" cy="1"/>
+            </a:xfrm>
+            <a:prstGeom prst="line">
+              <a:avLst/>
+            </a:prstGeom>
+            <a:ln w="38100"/>
+          </p:spPr>
+          <p:style>
+            <a:lnRef idx="1">
+              <a:schemeClr val="accent1"/>
+            </a:lnRef>
+            <a:fillRef idx="0">
+              <a:schemeClr val="accent1"/>
+            </a:fillRef>
+            <a:effectRef idx="0">
+              <a:schemeClr val="accent1"/>
+            </a:effectRef>
+            <a:fontRef idx="minor">
+              <a:schemeClr val="tx1"/>
+            </a:fontRef>
+          </p:style>
+        </p:cxnSp>
+        <p:sp>
+          <p:nvSpPr>
+            <p:cNvPr id="8" name="角丸四角形 7">
+              <a:extLst>
+                <a:ext uri="{FF2B5EF4-FFF2-40B4-BE49-F238E27FC236}">
+                  <a16:creationId xmlns:a16="http://schemas.microsoft.com/office/drawing/2014/main" id="{B82D2604-25F7-2F40-95E7-BCD2463F163E}"/>
+                </a:ext>
+              </a:extLst>
+            </p:cNvPr>
+            <p:cNvSpPr/>
+            <p:nvPr/>
+          </p:nvSpPr>
+          <p:spPr>
+            <a:xfrm>
+              <a:off x="1918741" y="367259"/>
+              <a:ext cx="849600" cy="457200"/>
+            </a:xfrm>
+            <a:prstGeom prst="roundRect">
+              <a:avLst/>
+            </a:prstGeom>
+            <a:noFill/>
+            <a:ln w="3175">
+              <a:solidFill>
+                <a:schemeClr val="tx1"/>
+              </a:solidFill>
+            </a:ln>
+          </p:spPr>
+          <p:style>
+            <a:lnRef idx="2">
+              <a:schemeClr val="accent1">
+                <a:shade val="50000"/>
+              </a:schemeClr>
+            </a:lnRef>
+            <a:fillRef idx="1">
+              <a:schemeClr val="accent1"/>
+            </a:fillRef>
+            <a:effectRef idx="0">
+              <a:schemeClr val="accent1"/>
+            </a:effectRef>
+            <a:fontRef idx="minor">
+              <a:schemeClr val="lt1"/>
+            </a:fontRef>
+          </p:style>
+          <p:txBody>
+            <a:bodyPr rtlCol="0" anchor="ctr"/>
+            <a:lstStyle/>
+            <a:p>
+              <a:pPr algn="ctr"/>
+              <a:endParaRPr kumimoji="1" lang="ja-JP" altLang="en-US"/>
+            </a:p>
+          </p:txBody>
+        </p:sp>
+        <p:sp>
+          <p:nvSpPr>
+            <p:cNvPr id="31" name="左大かっこ 30">
+              <a:extLst>
+                <a:ext uri="{FF2B5EF4-FFF2-40B4-BE49-F238E27FC236}">
+                  <a16:creationId xmlns:a16="http://schemas.microsoft.com/office/drawing/2014/main" id="{CEB2C58A-16E2-7841-A288-704B433A583B}"/>
+                </a:ext>
+              </a:extLst>
+            </p:cNvPr>
+            <p:cNvSpPr/>
+            <p:nvPr/>
+          </p:nvSpPr>
+          <p:spPr>
+            <a:xfrm>
+              <a:off x="1969315" y="457180"/>
+              <a:ext cx="45719" cy="277354"/>
+            </a:xfrm>
+            <a:prstGeom prst="leftBracket">
+              <a:avLst/>
+            </a:prstGeom>
+            <a:ln w="28575">
+              <a:solidFill>
+                <a:schemeClr val="tx1"/>
+              </a:solidFill>
+            </a:ln>
+          </p:spPr>
+          <p:style>
+            <a:lnRef idx="1">
+              <a:schemeClr val="accent1"/>
+            </a:lnRef>
+            <a:fillRef idx="0">
+              <a:schemeClr val="accent1"/>
+            </a:fillRef>
+            <a:effectRef idx="0">
+              <a:schemeClr val="accent1"/>
+            </a:effectRef>
+            <a:fontRef idx="minor">
+              <a:schemeClr val="tx1"/>
+            </a:fontRef>
+          </p:style>
+          <p:txBody>
+            <a:bodyPr rtlCol="0" anchor="ctr"/>
+            <a:lstStyle/>
+            <a:p>
+              <a:pPr algn="ctr"/>
+              <a:endParaRPr kumimoji="1" lang="ja-JP" altLang="en-US"/>
+            </a:p>
+          </p:txBody>
+        </p:sp>
+        <p:sp>
+          <p:nvSpPr>
+            <p:cNvPr id="32" name="右大かっこ 31">
+              <a:extLst>
+                <a:ext uri="{FF2B5EF4-FFF2-40B4-BE49-F238E27FC236}">
+                  <a16:creationId xmlns:a16="http://schemas.microsoft.com/office/drawing/2014/main" id="{ECFA0791-B54C-8F43-9006-9A13F2EE8D2B}"/>
+                </a:ext>
+              </a:extLst>
+            </p:cNvPr>
+            <p:cNvSpPr/>
+            <p:nvPr/>
+          </p:nvSpPr>
+          <p:spPr>
+            <a:xfrm>
+              <a:off x="2626227" y="457180"/>
+              <a:ext cx="45719" cy="277354"/>
+            </a:xfrm>
+            <a:prstGeom prst="rightBracket">
+              <a:avLst/>
+            </a:prstGeom>
+            <a:ln w="28575">
+              <a:solidFill>
+                <a:schemeClr val="tx1"/>
+              </a:solidFill>
+            </a:ln>
+          </p:spPr>
+          <p:style>
+            <a:lnRef idx="1">
+              <a:schemeClr val="accent1"/>
+            </a:lnRef>
+            <a:fillRef idx="0">
+              <a:schemeClr val="accent1"/>
+            </a:fillRef>
+            <a:effectRef idx="0">
+              <a:schemeClr val="accent1"/>
+            </a:effectRef>
+            <a:fontRef idx="minor">
+              <a:schemeClr val="tx1"/>
+            </a:fontRef>
+          </p:style>
+          <p:txBody>
+            <a:bodyPr rtlCol="0" anchor="ctr"/>
+            <a:lstStyle/>
+            <a:p>
+              <a:pPr algn="ctr"/>
+              <a:endParaRPr kumimoji="1" lang="ja-JP" altLang="en-US"/>
+            </a:p>
+          </p:txBody>
+        </p:sp>
+        <p:sp>
+          <p:nvSpPr>
+            <p:cNvPr id="9" name="円/楕円 8">
+              <a:extLst>
+                <a:ext uri="{FF2B5EF4-FFF2-40B4-BE49-F238E27FC236}">
+                  <a16:creationId xmlns:a16="http://schemas.microsoft.com/office/drawing/2014/main" id="{E86F5014-7781-9248-9A33-B2BD7A3799BB}"/>
+                </a:ext>
+              </a:extLst>
+            </p:cNvPr>
+            <p:cNvSpPr/>
+            <p:nvPr/>
+          </p:nvSpPr>
+          <p:spPr>
+            <a:xfrm>
+              <a:off x="2065607" y="504043"/>
+              <a:ext cx="169967" cy="183629"/>
+            </a:xfrm>
+            <a:prstGeom prst="ellipse">
+              <a:avLst/>
+            </a:prstGeom>
             <a:solidFill>
-              <a:schemeClr val="tx1"/>
+              <a:srgbClr val="FFFF00"/>
             </a:solidFill>
-          </a:ln>
-        </p:spPr>
-        <p:style>
-          <a:lnRef idx="2">
-            <a:schemeClr val="accent1">
-              <a:shade val="50000"/>
-            </a:schemeClr>
-          </a:lnRef>
-          <a:fillRef idx="1">
-            <a:schemeClr val="accent1"/>
-          </a:fillRef>
-          <a:effectRef idx="0">
-            <a:schemeClr val="accent1"/>
-          </a:effectRef>
-          <a:fontRef idx="minor">
-            <a:schemeClr val="lt1"/>
-          </a:fontRef>
-        </p:style>
-        <p:txBody>
-          <a:bodyPr rtlCol="0" anchor="ctr"/>
-          <a:lstStyle/>
-          <a:p>
-            <a:pPr algn="ctr"/>
-            <a:endParaRPr kumimoji="1" lang="ja-JP" altLang="en-US"/>
-          </a:p>
-        </p:txBody>
-      </p:sp>
-      <p:sp>
-        <p:nvSpPr>
-          <p:cNvPr id="31" name="左大かっこ 30">
-            <a:extLst>
-              <a:ext uri="{FF2B5EF4-FFF2-40B4-BE49-F238E27FC236}">
-                <a16:creationId xmlns:a16="http://schemas.microsoft.com/office/drawing/2014/main" id="{CEB2C58A-16E2-7841-A288-704B433A583B}"/>
-              </a:ext>
-            </a:extLst>
-          </p:cNvPr>
-          <p:cNvSpPr/>
-          <p:nvPr/>
-        </p:nvSpPr>
-        <p:spPr>
-          <a:xfrm>
-            <a:off x="1969315" y="457180"/>
-            <a:ext cx="45719" cy="277354"/>
-          </a:xfrm>
-          <a:prstGeom prst="leftBracket">
-            <a:avLst/>
-          </a:prstGeom>
-          <a:ln w="28575">
-            <a:solidFill>
-              <a:schemeClr val="tx1"/>
-            </a:solidFill>
-          </a:ln>
-        </p:spPr>
-        <p:style>
-          <a:lnRef idx="1">
-            <a:schemeClr val="accent1"/>
-          </a:lnRef>
-          <a:fillRef idx="0">
-            <a:schemeClr val="accent1"/>
-          </a:fillRef>
-          <a:effectRef idx="0">
-            <a:schemeClr val="accent1"/>
-          </a:effectRef>
-          <a:fontRef idx="minor">
-            <a:schemeClr val="tx1"/>
-          </a:fontRef>
-        </p:style>
-        <p:txBody>
-          <a:bodyPr rtlCol="0" anchor="ctr"/>
-          <a:lstStyle/>
-          <a:p>
-            <a:pPr algn="ctr"/>
-            <a:endParaRPr kumimoji="1" lang="ja-JP" altLang="en-US"/>
-          </a:p>
-        </p:txBody>
-      </p:sp>
-      <p:sp>
-        <p:nvSpPr>
-          <p:cNvPr id="32" name="右大かっこ 31">
-            <a:extLst>
-              <a:ext uri="{FF2B5EF4-FFF2-40B4-BE49-F238E27FC236}">
-                <a16:creationId xmlns:a16="http://schemas.microsoft.com/office/drawing/2014/main" id="{ECFA0791-B54C-8F43-9006-9A13F2EE8D2B}"/>
-              </a:ext>
-            </a:extLst>
-          </p:cNvPr>
-          <p:cNvSpPr/>
-          <p:nvPr/>
-        </p:nvSpPr>
-        <p:spPr>
-          <a:xfrm>
-            <a:off x="2626227" y="457180"/>
-            <a:ext cx="45719" cy="277354"/>
-          </a:xfrm>
-          <a:prstGeom prst="rightBracket">
-            <a:avLst/>
-          </a:prstGeom>
-          <a:ln w="28575">
-            <a:solidFill>
-              <a:schemeClr val="tx1"/>
-            </a:solidFill>
-          </a:ln>
-        </p:spPr>
-        <p:style>
-          <a:lnRef idx="1">
-            <a:schemeClr val="accent1"/>
-          </a:lnRef>
-          <a:fillRef idx="0">
-            <a:schemeClr val="accent1"/>
-          </a:fillRef>
-          <a:effectRef idx="0">
-            <a:schemeClr val="accent1"/>
-          </a:effectRef>
-          <a:fontRef idx="minor">
-            <a:schemeClr val="tx1"/>
-          </a:fontRef>
-        </p:style>
-        <p:txBody>
-          <a:bodyPr rtlCol="0" anchor="ctr"/>
-          <a:lstStyle/>
-          <a:p>
-            <a:pPr algn="ctr"/>
-            <a:endParaRPr kumimoji="1" lang="ja-JP" altLang="en-US"/>
-          </a:p>
-        </p:txBody>
-      </p:sp>
+            <a:ln>
+              <a:solidFill>
+                <a:schemeClr val="tx1"/>
+              </a:solidFill>
+            </a:ln>
+          </p:spPr>
+          <p:style>
+            <a:lnRef idx="2">
+              <a:schemeClr val="accent1">
+                <a:shade val="50000"/>
+              </a:schemeClr>
+            </a:lnRef>
+            <a:fillRef idx="1">
+              <a:schemeClr val="accent1"/>
+            </a:fillRef>
+            <a:effectRef idx="0">
+              <a:schemeClr val="accent1"/>
+            </a:effectRef>
+            <a:fontRef idx="minor">
+              <a:schemeClr val="lt1"/>
+            </a:fontRef>
+          </p:style>
+          <p:txBody>
+            <a:bodyPr rtlCol="0" anchor="ctr"/>
+            <a:lstStyle/>
+            <a:p>
+              <a:pPr algn="ctr"/>
+              <a:endParaRPr kumimoji="1" lang="ja-JP" altLang="en-US"/>
+            </a:p>
+          </p:txBody>
+        </p:sp>
+        <p:sp>
+          <p:nvSpPr>
+            <p:cNvPr id="10" name="正方形/長方形 9">
+              <a:extLst>
+                <a:ext uri="{FF2B5EF4-FFF2-40B4-BE49-F238E27FC236}">
+                  <a16:creationId xmlns:a16="http://schemas.microsoft.com/office/drawing/2014/main" id="{2BFFECFC-5765-0745-8303-A82F4C53E4D9}"/>
+                </a:ext>
+              </a:extLst>
+            </p:cNvPr>
+            <p:cNvSpPr/>
+            <p:nvPr/>
+          </p:nvSpPr>
+          <p:spPr>
+            <a:xfrm>
+              <a:off x="2382440" y="504043"/>
+              <a:ext cx="183600" cy="183629"/>
+            </a:xfrm>
+            <a:prstGeom prst="rect">
+              <a:avLst/>
+            </a:prstGeom>
+            <a:ln>
+              <a:solidFill>
+                <a:schemeClr val="tx1"/>
+              </a:solidFill>
+            </a:ln>
+          </p:spPr>
+          <p:style>
+            <a:lnRef idx="2">
+              <a:schemeClr val="accent1">
+                <a:shade val="50000"/>
+              </a:schemeClr>
+            </a:lnRef>
+            <a:fillRef idx="1">
+              <a:schemeClr val="accent1"/>
+            </a:fillRef>
+            <a:effectRef idx="0">
+              <a:schemeClr val="accent1"/>
+            </a:effectRef>
+            <a:fontRef idx="minor">
+              <a:schemeClr val="lt1"/>
+            </a:fontRef>
+          </p:style>
+          <p:txBody>
+            <a:bodyPr rtlCol="0" anchor="ctr"/>
+            <a:lstStyle/>
+            <a:p>
+              <a:pPr algn="ctr"/>
+              <a:endParaRPr kumimoji="1" lang="ja-JP" altLang="en-US"/>
+            </a:p>
+          </p:txBody>
+        </p:sp>
+      </p:grpSp>
     </p:spTree>
     <p:extLst>
       <p:ext uri="{BB962C8B-B14F-4D97-AF65-F5344CB8AC3E}">

</xml_diff>

<commit_message>
create FragmentFunction and Glid systecreate FragmentFunction and Glid systemm
</commit_message>
<xml_diff>
--- a/DrawrINGS画像.pptx
+++ b/DrawrINGS画像.pptx
@@ -261,7 +261,7 @@
           <a:p>
             <a:fld id="{B641BC39-9F55-A846-8441-7F2AEC0C3AF0}" type="datetimeFigureOut">
               <a:rPr kumimoji="1" lang="ja-JP" altLang="en-US" smtClean="0"/>
-              <a:t>2018/5/5</a:t>
+              <a:t>2018/5/24</a:t>
             </a:fld>
             <a:endParaRPr kumimoji="1" lang="ja-JP" altLang="en-US"/>
           </a:p>
@@ -491,7 +491,7 @@
           <a:p>
             <a:fld id="{B641BC39-9F55-A846-8441-7F2AEC0C3AF0}" type="datetimeFigureOut">
               <a:rPr kumimoji="1" lang="ja-JP" altLang="en-US" smtClean="0"/>
-              <a:t>2018/5/5</a:t>
+              <a:t>2018/5/24</a:t>
             </a:fld>
             <a:endParaRPr kumimoji="1" lang="ja-JP" altLang="en-US"/>
           </a:p>
@@ -731,7 +731,7 @@
           <a:p>
             <a:fld id="{B641BC39-9F55-A846-8441-7F2AEC0C3AF0}" type="datetimeFigureOut">
               <a:rPr kumimoji="1" lang="ja-JP" altLang="en-US" smtClean="0"/>
-              <a:t>2018/5/5</a:t>
+              <a:t>2018/5/24</a:t>
             </a:fld>
             <a:endParaRPr kumimoji="1" lang="ja-JP" altLang="en-US"/>
           </a:p>
@@ -961,7 +961,7 @@
           <a:p>
             <a:fld id="{B641BC39-9F55-A846-8441-7F2AEC0C3AF0}" type="datetimeFigureOut">
               <a:rPr kumimoji="1" lang="ja-JP" altLang="en-US" smtClean="0"/>
-              <a:t>2018/5/5</a:t>
+              <a:t>2018/5/24</a:t>
             </a:fld>
             <a:endParaRPr kumimoji="1" lang="ja-JP" altLang="en-US"/>
           </a:p>
@@ -1236,7 +1236,7 @@
           <a:p>
             <a:fld id="{B641BC39-9F55-A846-8441-7F2AEC0C3AF0}" type="datetimeFigureOut">
               <a:rPr kumimoji="1" lang="ja-JP" altLang="en-US" smtClean="0"/>
-              <a:t>2018/5/5</a:t>
+              <a:t>2018/5/24</a:t>
             </a:fld>
             <a:endParaRPr kumimoji="1" lang="ja-JP" altLang="en-US"/>
           </a:p>
@@ -1565,7 +1565,7 @@
           <a:p>
             <a:fld id="{B641BC39-9F55-A846-8441-7F2AEC0C3AF0}" type="datetimeFigureOut">
               <a:rPr kumimoji="1" lang="ja-JP" altLang="en-US" smtClean="0"/>
-              <a:t>2018/5/5</a:t>
+              <a:t>2018/5/24</a:t>
             </a:fld>
             <a:endParaRPr kumimoji="1" lang="ja-JP" altLang="en-US"/>
           </a:p>
@@ -2041,7 +2041,7 @@
           <a:p>
             <a:fld id="{B641BC39-9F55-A846-8441-7F2AEC0C3AF0}" type="datetimeFigureOut">
               <a:rPr kumimoji="1" lang="ja-JP" altLang="en-US" smtClean="0"/>
-              <a:t>2018/5/5</a:t>
+              <a:t>2018/5/24</a:t>
             </a:fld>
             <a:endParaRPr kumimoji="1" lang="ja-JP" altLang="en-US"/>
           </a:p>
@@ -2182,7 +2182,7 @@
           <a:p>
             <a:fld id="{B641BC39-9F55-A846-8441-7F2AEC0C3AF0}" type="datetimeFigureOut">
               <a:rPr kumimoji="1" lang="ja-JP" altLang="en-US" smtClean="0"/>
-              <a:t>2018/5/5</a:t>
+              <a:t>2018/5/24</a:t>
             </a:fld>
             <a:endParaRPr kumimoji="1" lang="ja-JP" altLang="en-US"/>
           </a:p>
@@ -2295,7 +2295,7 @@
           <a:p>
             <a:fld id="{B641BC39-9F55-A846-8441-7F2AEC0C3AF0}" type="datetimeFigureOut">
               <a:rPr kumimoji="1" lang="ja-JP" altLang="en-US" smtClean="0"/>
-              <a:t>2018/5/5</a:t>
+              <a:t>2018/5/24</a:t>
             </a:fld>
             <a:endParaRPr kumimoji="1" lang="ja-JP" altLang="en-US"/>
           </a:p>
@@ -2638,7 +2638,7 @@
           <a:p>
             <a:fld id="{B641BC39-9F55-A846-8441-7F2AEC0C3AF0}" type="datetimeFigureOut">
               <a:rPr kumimoji="1" lang="ja-JP" altLang="en-US" smtClean="0"/>
-              <a:t>2018/5/5</a:t>
+              <a:t>2018/5/24</a:t>
             </a:fld>
             <a:endParaRPr kumimoji="1" lang="ja-JP" altLang="en-US"/>
           </a:p>
@@ -2926,7 +2926,7 @@
           <a:p>
             <a:fld id="{B641BC39-9F55-A846-8441-7F2AEC0C3AF0}" type="datetimeFigureOut">
               <a:rPr kumimoji="1" lang="ja-JP" altLang="en-US" smtClean="0"/>
-              <a:t>2018/5/5</a:t>
+              <a:t>2018/5/24</a:t>
             </a:fld>
             <a:endParaRPr kumimoji="1" lang="ja-JP" altLang="en-US"/>
           </a:p>
@@ -3199,7 +3199,7 @@
           <a:p>
             <a:fld id="{B641BC39-9F55-A846-8441-7F2AEC0C3AF0}" type="datetimeFigureOut">
               <a:rPr kumimoji="1" lang="ja-JP" altLang="en-US" smtClean="0"/>
-              <a:t>2018/5/5</a:t>
+              <a:t>2018/5/24</a:t>
             </a:fld>
             <a:endParaRPr kumimoji="1" lang="ja-JP" altLang="en-US"/>
           </a:p>
@@ -5610,6 +5610,853 @@
           </p:txBody>
         </p:sp>
       </p:grpSp>
+      <p:grpSp>
+        <p:nvGrpSpPr>
+          <p:cNvPr id="49" name="グループ化 48">
+            <a:extLst>
+              <a:ext uri="{FF2B5EF4-FFF2-40B4-BE49-F238E27FC236}">
+                <a16:creationId xmlns:a16="http://schemas.microsoft.com/office/drawing/2014/main" id="{E336E08B-B590-7741-A025-7B9520FE0576}"/>
+              </a:ext>
+            </a:extLst>
+          </p:cNvPr>
+          <p:cNvGrpSpPr/>
+          <p:nvPr/>
+        </p:nvGrpSpPr>
+        <p:grpSpPr>
+          <a:xfrm>
+            <a:off x="3062599" y="367259"/>
+            <a:ext cx="834438" cy="457200"/>
+            <a:chOff x="3062599" y="367259"/>
+            <a:chExt cx="834438" cy="457200"/>
+          </a:xfrm>
+        </p:grpSpPr>
+        <p:sp>
+          <p:nvSpPr>
+            <p:cNvPr id="2" name="角丸四角形 1">
+              <a:extLst>
+                <a:ext uri="{FF2B5EF4-FFF2-40B4-BE49-F238E27FC236}">
+                  <a16:creationId xmlns:a16="http://schemas.microsoft.com/office/drawing/2014/main" id="{BFF1FB1D-FA9F-E44D-AB00-97CEAF45BA29}"/>
+                </a:ext>
+              </a:extLst>
+            </p:cNvPr>
+            <p:cNvSpPr/>
+            <p:nvPr/>
+          </p:nvSpPr>
+          <p:spPr>
+            <a:xfrm>
+              <a:off x="3062599" y="367259"/>
+              <a:ext cx="834438" cy="457200"/>
+            </a:xfrm>
+            <a:prstGeom prst="roundRect">
+              <a:avLst/>
+            </a:prstGeom>
+            <a:noFill/>
+            <a:ln>
+              <a:solidFill>
+                <a:schemeClr val="tx1"/>
+              </a:solidFill>
+            </a:ln>
+          </p:spPr>
+          <p:style>
+            <a:lnRef idx="2">
+              <a:schemeClr val="accent1">
+                <a:shade val="50000"/>
+              </a:schemeClr>
+            </a:lnRef>
+            <a:fillRef idx="1">
+              <a:schemeClr val="accent1"/>
+            </a:fillRef>
+            <a:effectRef idx="0">
+              <a:schemeClr val="accent1"/>
+            </a:effectRef>
+            <a:fontRef idx="minor">
+              <a:schemeClr val="lt1"/>
+            </a:fontRef>
+          </p:style>
+          <p:txBody>
+            <a:bodyPr rtlCol="0" anchor="ctr"/>
+            <a:lstStyle/>
+            <a:p>
+              <a:pPr algn="ctr"/>
+              <a:endParaRPr kumimoji="1" lang="ja-JP" altLang="en-US"/>
+            </a:p>
+          </p:txBody>
+        </p:sp>
+        <p:cxnSp>
+          <p:nvCxnSpPr>
+            <p:cNvPr id="7" name="直線コネクタ 6">
+              <a:extLst>
+                <a:ext uri="{FF2B5EF4-FFF2-40B4-BE49-F238E27FC236}">
+                  <a16:creationId xmlns:a16="http://schemas.microsoft.com/office/drawing/2014/main" id="{EBEA708E-CB7E-6141-8882-4B0135A8F286}"/>
+                </a:ext>
+              </a:extLst>
+            </p:cNvPr>
+            <p:cNvCxnSpPr>
+              <a:stCxn id="14" idx="3"/>
+              <a:endCxn id="3" idx="1"/>
+            </p:cNvCxnSpPr>
+            <p:nvPr/>
+          </p:nvCxnSpPr>
+          <p:spPr>
+            <a:xfrm>
+              <a:off x="3721940" y="595857"/>
+              <a:ext cx="72186" cy="0"/>
+            </a:xfrm>
+            <a:prstGeom prst="line">
+              <a:avLst/>
+            </a:prstGeom>
+          </p:spPr>
+          <p:style>
+            <a:lnRef idx="1">
+              <a:schemeClr val="accent1"/>
+            </a:lnRef>
+            <a:fillRef idx="0">
+              <a:schemeClr val="accent1"/>
+            </a:fillRef>
+            <a:effectRef idx="0">
+              <a:schemeClr val="accent1"/>
+            </a:effectRef>
+            <a:fontRef idx="minor">
+              <a:schemeClr val="tx1"/>
+            </a:fontRef>
+          </p:style>
+        </p:cxnSp>
+        <p:cxnSp>
+          <p:nvCxnSpPr>
+            <p:cNvPr id="20" name="直線コネクタ 19">
+              <a:extLst>
+                <a:ext uri="{FF2B5EF4-FFF2-40B4-BE49-F238E27FC236}">
+                  <a16:creationId xmlns:a16="http://schemas.microsoft.com/office/drawing/2014/main" id="{59829C8D-33BF-0E49-B711-D26CDCB19580}"/>
+                </a:ext>
+              </a:extLst>
+            </p:cNvPr>
+            <p:cNvCxnSpPr>
+              <a:cxnSpLocks/>
+              <a:stCxn id="4" idx="6"/>
+              <a:endCxn id="14" idx="1"/>
+            </p:cNvCxnSpPr>
+            <p:nvPr/>
+          </p:nvCxnSpPr>
+          <p:spPr>
+            <a:xfrm>
+              <a:off x="3577754" y="595857"/>
+              <a:ext cx="72186" cy="0"/>
+            </a:xfrm>
+            <a:prstGeom prst="line">
+              <a:avLst/>
+            </a:prstGeom>
+          </p:spPr>
+          <p:style>
+            <a:lnRef idx="1">
+              <a:schemeClr val="accent1"/>
+            </a:lnRef>
+            <a:fillRef idx="0">
+              <a:schemeClr val="accent1"/>
+            </a:fillRef>
+            <a:effectRef idx="0">
+              <a:schemeClr val="accent1"/>
+            </a:effectRef>
+            <a:fontRef idx="minor">
+              <a:schemeClr val="tx1"/>
+            </a:fontRef>
+          </p:style>
+        </p:cxnSp>
+        <p:cxnSp>
+          <p:nvCxnSpPr>
+            <p:cNvPr id="23" name="直線コネクタ 22">
+              <a:extLst>
+                <a:ext uri="{FF2B5EF4-FFF2-40B4-BE49-F238E27FC236}">
+                  <a16:creationId xmlns:a16="http://schemas.microsoft.com/office/drawing/2014/main" id="{51CDE3FD-98BF-1048-AB4B-CD2817912017}"/>
+                </a:ext>
+              </a:extLst>
+            </p:cNvPr>
+            <p:cNvCxnSpPr>
+              <a:cxnSpLocks/>
+              <a:stCxn id="16" idx="5"/>
+              <a:endCxn id="4" idx="1"/>
+            </p:cNvCxnSpPr>
+            <p:nvPr/>
+          </p:nvCxnSpPr>
+          <p:spPr>
+            <a:xfrm>
+              <a:off x="3420167" y="516245"/>
+              <a:ext cx="96131" cy="53713"/>
+            </a:xfrm>
+            <a:prstGeom prst="line">
+              <a:avLst/>
+            </a:prstGeom>
+          </p:spPr>
+          <p:style>
+            <a:lnRef idx="1">
+              <a:schemeClr val="accent1"/>
+            </a:lnRef>
+            <a:fillRef idx="0">
+              <a:schemeClr val="accent1"/>
+            </a:fillRef>
+            <a:effectRef idx="0">
+              <a:schemeClr val="accent1"/>
+            </a:effectRef>
+            <a:fontRef idx="minor">
+              <a:schemeClr val="tx1"/>
+            </a:fontRef>
+          </p:style>
+        </p:cxnSp>
+        <p:cxnSp>
+          <p:nvCxnSpPr>
+            <p:cNvPr id="28" name="直線コネクタ 27">
+              <a:extLst>
+                <a:ext uri="{FF2B5EF4-FFF2-40B4-BE49-F238E27FC236}">
+                  <a16:creationId xmlns:a16="http://schemas.microsoft.com/office/drawing/2014/main" id="{B342CC34-E28D-4E40-B246-3840F4045414}"/>
+                </a:ext>
+              </a:extLst>
+            </p:cNvPr>
+            <p:cNvCxnSpPr>
+              <a:cxnSpLocks/>
+              <a:stCxn id="17" idx="7"/>
+              <a:endCxn id="4" idx="3"/>
+            </p:cNvCxnSpPr>
+            <p:nvPr/>
+          </p:nvCxnSpPr>
+          <p:spPr>
+            <a:xfrm flipV="1">
+              <a:off x="3420167" y="621755"/>
+              <a:ext cx="96131" cy="71291"/>
+            </a:xfrm>
+            <a:prstGeom prst="line">
+              <a:avLst/>
+            </a:prstGeom>
+          </p:spPr>
+          <p:style>
+            <a:lnRef idx="1">
+              <a:schemeClr val="accent1"/>
+            </a:lnRef>
+            <a:fillRef idx="0">
+              <a:schemeClr val="accent1"/>
+            </a:fillRef>
+            <a:effectRef idx="0">
+              <a:schemeClr val="accent1"/>
+            </a:effectRef>
+            <a:fontRef idx="minor">
+              <a:schemeClr val="tx1"/>
+            </a:fontRef>
+          </p:style>
+        </p:cxnSp>
+        <p:sp>
+          <p:nvSpPr>
+            <p:cNvPr id="34" name="左中かっこ 33">
+              <a:extLst>
+                <a:ext uri="{FF2B5EF4-FFF2-40B4-BE49-F238E27FC236}">
+                  <a16:creationId xmlns:a16="http://schemas.microsoft.com/office/drawing/2014/main" id="{F077A548-C91A-3E48-971D-43F289D26F92}"/>
+                </a:ext>
+              </a:extLst>
+            </p:cNvPr>
+            <p:cNvSpPr/>
+            <p:nvPr/>
+          </p:nvSpPr>
+          <p:spPr>
+            <a:xfrm>
+              <a:off x="3271433" y="411706"/>
+              <a:ext cx="104473" cy="368300"/>
+            </a:xfrm>
+            <a:prstGeom prst="leftBrace">
+              <a:avLst/>
+            </a:prstGeom>
+            <a:ln w="19050">
+              <a:solidFill>
+                <a:schemeClr val="tx1"/>
+              </a:solidFill>
+            </a:ln>
+          </p:spPr>
+          <p:style>
+            <a:lnRef idx="1">
+              <a:schemeClr val="accent1"/>
+            </a:lnRef>
+            <a:fillRef idx="0">
+              <a:schemeClr val="accent1"/>
+            </a:fillRef>
+            <a:effectRef idx="0">
+              <a:schemeClr val="accent1"/>
+            </a:effectRef>
+            <a:fontRef idx="minor">
+              <a:schemeClr val="tx1"/>
+            </a:fontRef>
+          </p:style>
+          <p:txBody>
+            <a:bodyPr rtlCol="0" anchor="ctr"/>
+            <a:lstStyle/>
+            <a:p>
+              <a:pPr algn="ctr"/>
+              <a:endParaRPr kumimoji="1" lang="ja-JP" altLang="en-US"/>
+            </a:p>
+          </p:txBody>
+        </p:sp>
+        <p:cxnSp>
+          <p:nvCxnSpPr>
+            <p:cNvPr id="38" name="直線コネクタ 37">
+              <a:extLst>
+                <a:ext uri="{FF2B5EF4-FFF2-40B4-BE49-F238E27FC236}">
+                  <a16:creationId xmlns:a16="http://schemas.microsoft.com/office/drawing/2014/main" id="{793FA836-8BA0-DA4C-B0B2-CDC7EAEE537A}"/>
+                </a:ext>
+              </a:extLst>
+            </p:cNvPr>
+            <p:cNvCxnSpPr>
+              <a:cxnSpLocks/>
+              <a:stCxn id="37" idx="6"/>
+              <a:endCxn id="35" idx="2"/>
+            </p:cNvCxnSpPr>
+            <p:nvPr/>
+          </p:nvCxnSpPr>
+          <p:spPr>
+            <a:xfrm flipV="1">
+              <a:off x="3155172" y="490347"/>
+              <a:ext cx="61456" cy="782"/>
+            </a:xfrm>
+            <a:prstGeom prst="line">
+              <a:avLst/>
+            </a:prstGeom>
+          </p:spPr>
+          <p:style>
+            <a:lnRef idx="1">
+              <a:schemeClr val="accent1"/>
+            </a:lnRef>
+            <a:fillRef idx="0">
+              <a:schemeClr val="accent1"/>
+            </a:fillRef>
+            <a:effectRef idx="0">
+              <a:schemeClr val="accent1"/>
+            </a:effectRef>
+            <a:fontRef idx="minor">
+              <a:schemeClr val="tx1"/>
+            </a:fontRef>
+          </p:style>
+        </p:cxnSp>
+        <p:cxnSp>
+          <p:nvCxnSpPr>
+            <p:cNvPr id="44" name="直線コネクタ 43">
+              <a:extLst>
+                <a:ext uri="{FF2B5EF4-FFF2-40B4-BE49-F238E27FC236}">
+                  <a16:creationId xmlns:a16="http://schemas.microsoft.com/office/drawing/2014/main" id="{DFCD23E7-3514-DD49-9AEE-CF6FCEF3679F}"/>
+                </a:ext>
+              </a:extLst>
+            </p:cNvPr>
+            <p:cNvCxnSpPr>
+              <a:cxnSpLocks/>
+              <a:stCxn id="43" idx="6"/>
+              <a:endCxn id="42" idx="1"/>
+            </p:cNvCxnSpPr>
+            <p:nvPr/>
+          </p:nvCxnSpPr>
+          <p:spPr>
+            <a:xfrm flipV="1">
+              <a:off x="3156410" y="718945"/>
+              <a:ext cx="60218" cy="517"/>
+            </a:xfrm>
+            <a:prstGeom prst="line">
+              <a:avLst/>
+            </a:prstGeom>
+          </p:spPr>
+          <p:style>
+            <a:lnRef idx="1">
+              <a:schemeClr val="accent1"/>
+            </a:lnRef>
+            <a:fillRef idx="0">
+              <a:schemeClr val="accent1"/>
+            </a:fillRef>
+            <a:effectRef idx="0">
+              <a:schemeClr val="accent1"/>
+            </a:effectRef>
+            <a:fontRef idx="minor">
+              <a:schemeClr val="tx1"/>
+            </a:fontRef>
+          </p:style>
+        </p:cxnSp>
+        <p:sp>
+          <p:nvSpPr>
+            <p:cNvPr id="3" name="正方形/長方形 2">
+              <a:extLst>
+                <a:ext uri="{FF2B5EF4-FFF2-40B4-BE49-F238E27FC236}">
+                  <a16:creationId xmlns:a16="http://schemas.microsoft.com/office/drawing/2014/main" id="{E9E7179B-700B-3E45-8449-20292D598554}"/>
+                </a:ext>
+              </a:extLst>
+            </p:cNvPr>
+            <p:cNvSpPr/>
+            <p:nvPr/>
+          </p:nvSpPr>
+          <p:spPr>
+            <a:xfrm>
+              <a:off x="3794126" y="559231"/>
+              <a:ext cx="72000" cy="73251"/>
+            </a:xfrm>
+            <a:prstGeom prst="rect">
+              <a:avLst/>
+            </a:prstGeom>
+            <a:solidFill>
+              <a:schemeClr val="accent1"/>
+            </a:solidFill>
+            <a:ln>
+              <a:solidFill>
+                <a:schemeClr val="tx1"/>
+              </a:solidFill>
+            </a:ln>
+          </p:spPr>
+          <p:style>
+            <a:lnRef idx="2">
+              <a:schemeClr val="accent1">
+                <a:shade val="50000"/>
+              </a:schemeClr>
+            </a:lnRef>
+            <a:fillRef idx="1">
+              <a:schemeClr val="accent1"/>
+            </a:fillRef>
+            <a:effectRef idx="0">
+              <a:schemeClr val="accent1"/>
+            </a:effectRef>
+            <a:fontRef idx="minor">
+              <a:schemeClr val="lt1"/>
+            </a:fontRef>
+          </p:style>
+          <p:txBody>
+            <a:bodyPr rtlCol="0" anchor="ctr"/>
+            <a:lstStyle/>
+            <a:p>
+              <a:pPr algn="ctr"/>
+              <a:endParaRPr kumimoji="1" lang="ja-JP" altLang="en-US"/>
+            </a:p>
+          </p:txBody>
+        </p:sp>
+        <p:sp>
+          <p:nvSpPr>
+            <p:cNvPr id="14" name="正方形/長方形 13">
+              <a:extLst>
+                <a:ext uri="{FF2B5EF4-FFF2-40B4-BE49-F238E27FC236}">
+                  <a16:creationId xmlns:a16="http://schemas.microsoft.com/office/drawing/2014/main" id="{28AA78C6-814F-AA45-99B9-2BA02D189C55}"/>
+                </a:ext>
+              </a:extLst>
+            </p:cNvPr>
+            <p:cNvSpPr/>
+            <p:nvPr/>
+          </p:nvSpPr>
+          <p:spPr>
+            <a:xfrm>
+              <a:off x="3649940" y="559231"/>
+              <a:ext cx="72000" cy="73251"/>
+            </a:xfrm>
+            <a:prstGeom prst="rect">
+              <a:avLst/>
+            </a:prstGeom>
+            <a:solidFill>
+              <a:schemeClr val="accent1"/>
+            </a:solidFill>
+            <a:ln>
+              <a:solidFill>
+                <a:schemeClr val="tx1"/>
+              </a:solidFill>
+            </a:ln>
+          </p:spPr>
+          <p:style>
+            <a:lnRef idx="2">
+              <a:schemeClr val="accent1">
+                <a:shade val="50000"/>
+              </a:schemeClr>
+            </a:lnRef>
+            <a:fillRef idx="1">
+              <a:schemeClr val="accent1"/>
+            </a:fillRef>
+            <a:effectRef idx="0">
+              <a:schemeClr val="accent1"/>
+            </a:effectRef>
+            <a:fontRef idx="minor">
+              <a:schemeClr val="lt1"/>
+            </a:fontRef>
+          </p:style>
+          <p:txBody>
+            <a:bodyPr rtlCol="0" anchor="ctr"/>
+            <a:lstStyle/>
+            <a:p>
+              <a:pPr algn="ctr"/>
+              <a:endParaRPr kumimoji="1" lang="ja-JP" altLang="en-US"/>
+            </a:p>
+          </p:txBody>
+        </p:sp>
+        <p:sp>
+          <p:nvSpPr>
+            <p:cNvPr id="4" name="円/楕円 3">
+              <a:extLst>
+                <a:ext uri="{FF2B5EF4-FFF2-40B4-BE49-F238E27FC236}">
+                  <a16:creationId xmlns:a16="http://schemas.microsoft.com/office/drawing/2014/main" id="{AD0CF141-3192-A849-A7C0-AEF1ED6197C3}"/>
+                </a:ext>
+              </a:extLst>
+            </p:cNvPr>
+            <p:cNvSpPr/>
+            <p:nvPr/>
+          </p:nvSpPr>
+          <p:spPr>
+            <a:xfrm>
+              <a:off x="3505754" y="559231"/>
+              <a:ext cx="72000" cy="73251"/>
+            </a:xfrm>
+            <a:prstGeom prst="ellipse">
+              <a:avLst/>
+            </a:prstGeom>
+            <a:solidFill>
+              <a:schemeClr val="accent6"/>
+            </a:solidFill>
+            <a:ln>
+              <a:solidFill>
+                <a:schemeClr val="tx1"/>
+              </a:solidFill>
+            </a:ln>
+          </p:spPr>
+          <p:style>
+            <a:lnRef idx="2">
+              <a:schemeClr val="accent1">
+                <a:shade val="50000"/>
+              </a:schemeClr>
+            </a:lnRef>
+            <a:fillRef idx="1">
+              <a:schemeClr val="accent1"/>
+            </a:fillRef>
+            <a:effectRef idx="0">
+              <a:schemeClr val="accent1"/>
+            </a:effectRef>
+            <a:fontRef idx="minor">
+              <a:schemeClr val="lt1"/>
+            </a:fontRef>
+          </p:style>
+          <p:txBody>
+            <a:bodyPr rtlCol="0" anchor="ctr"/>
+            <a:lstStyle/>
+            <a:p>
+              <a:pPr algn="ctr"/>
+              <a:endParaRPr kumimoji="1" lang="ja-JP" altLang="en-US"/>
+            </a:p>
+          </p:txBody>
+        </p:sp>
+        <p:sp>
+          <p:nvSpPr>
+            <p:cNvPr id="16" name="円/楕円 15">
+              <a:extLst>
+                <a:ext uri="{FF2B5EF4-FFF2-40B4-BE49-F238E27FC236}">
+                  <a16:creationId xmlns:a16="http://schemas.microsoft.com/office/drawing/2014/main" id="{BCA329DB-139E-F149-933F-BB0DFF2A2BCB}"/>
+                </a:ext>
+              </a:extLst>
+            </p:cNvPr>
+            <p:cNvSpPr/>
+            <p:nvPr/>
+          </p:nvSpPr>
+          <p:spPr>
+            <a:xfrm>
+              <a:off x="3358711" y="453721"/>
+              <a:ext cx="72000" cy="73251"/>
+            </a:xfrm>
+            <a:prstGeom prst="ellipse">
+              <a:avLst/>
+            </a:prstGeom>
+            <a:solidFill>
+              <a:schemeClr val="accent6"/>
+            </a:solidFill>
+            <a:ln>
+              <a:solidFill>
+                <a:schemeClr val="tx1"/>
+              </a:solidFill>
+            </a:ln>
+          </p:spPr>
+          <p:style>
+            <a:lnRef idx="2">
+              <a:schemeClr val="accent1">
+                <a:shade val="50000"/>
+              </a:schemeClr>
+            </a:lnRef>
+            <a:fillRef idx="1">
+              <a:schemeClr val="accent1"/>
+            </a:fillRef>
+            <a:effectRef idx="0">
+              <a:schemeClr val="accent1"/>
+            </a:effectRef>
+            <a:fontRef idx="minor">
+              <a:schemeClr val="lt1"/>
+            </a:fontRef>
+          </p:style>
+          <p:txBody>
+            <a:bodyPr rtlCol="0" anchor="ctr"/>
+            <a:lstStyle/>
+            <a:p>
+              <a:pPr algn="ctr"/>
+              <a:endParaRPr kumimoji="1" lang="ja-JP" altLang="en-US"/>
+            </a:p>
+          </p:txBody>
+        </p:sp>
+        <p:sp>
+          <p:nvSpPr>
+            <p:cNvPr id="17" name="円/楕円 16">
+              <a:extLst>
+                <a:ext uri="{FF2B5EF4-FFF2-40B4-BE49-F238E27FC236}">
+                  <a16:creationId xmlns:a16="http://schemas.microsoft.com/office/drawing/2014/main" id="{8B1AF5A3-F8FC-D04C-8375-2897C82ACF41}"/>
+                </a:ext>
+              </a:extLst>
+            </p:cNvPr>
+            <p:cNvSpPr/>
+            <p:nvPr/>
+          </p:nvSpPr>
+          <p:spPr>
+            <a:xfrm>
+              <a:off x="3358711" y="682319"/>
+              <a:ext cx="72000" cy="73251"/>
+            </a:xfrm>
+            <a:prstGeom prst="ellipse">
+              <a:avLst/>
+            </a:prstGeom>
+            <a:solidFill>
+              <a:schemeClr val="accent6"/>
+            </a:solidFill>
+            <a:ln>
+              <a:solidFill>
+                <a:schemeClr val="tx1"/>
+              </a:solidFill>
+            </a:ln>
+          </p:spPr>
+          <p:style>
+            <a:lnRef idx="2">
+              <a:schemeClr val="accent1">
+                <a:shade val="50000"/>
+              </a:schemeClr>
+            </a:lnRef>
+            <a:fillRef idx="1">
+              <a:schemeClr val="accent1"/>
+            </a:fillRef>
+            <a:effectRef idx="0">
+              <a:schemeClr val="accent1"/>
+            </a:effectRef>
+            <a:fontRef idx="minor">
+              <a:schemeClr val="lt1"/>
+            </a:fontRef>
+          </p:style>
+          <p:txBody>
+            <a:bodyPr rtlCol="0" anchor="ctr"/>
+            <a:lstStyle/>
+            <a:p>
+              <a:pPr algn="ctr"/>
+              <a:endParaRPr kumimoji="1" lang="ja-JP" altLang="en-US"/>
+            </a:p>
+          </p:txBody>
+        </p:sp>
+        <p:sp>
+          <p:nvSpPr>
+            <p:cNvPr id="35" name="円/楕円 34">
+              <a:extLst>
+                <a:ext uri="{FF2B5EF4-FFF2-40B4-BE49-F238E27FC236}">
+                  <a16:creationId xmlns:a16="http://schemas.microsoft.com/office/drawing/2014/main" id="{1C060AC0-963A-4347-BB05-E6937B3AE363}"/>
+                </a:ext>
+              </a:extLst>
+            </p:cNvPr>
+            <p:cNvSpPr/>
+            <p:nvPr/>
+          </p:nvSpPr>
+          <p:spPr>
+            <a:xfrm>
+              <a:off x="3216628" y="453721"/>
+              <a:ext cx="72000" cy="73251"/>
+            </a:xfrm>
+            <a:prstGeom prst="ellipse">
+              <a:avLst/>
+            </a:prstGeom>
+            <a:solidFill>
+              <a:schemeClr val="accent6"/>
+            </a:solidFill>
+            <a:ln>
+              <a:solidFill>
+                <a:schemeClr val="tx1"/>
+              </a:solidFill>
+            </a:ln>
+          </p:spPr>
+          <p:style>
+            <a:lnRef idx="2">
+              <a:schemeClr val="accent1">
+                <a:shade val="50000"/>
+              </a:schemeClr>
+            </a:lnRef>
+            <a:fillRef idx="1">
+              <a:schemeClr val="accent1"/>
+            </a:fillRef>
+            <a:effectRef idx="0">
+              <a:schemeClr val="accent1"/>
+            </a:effectRef>
+            <a:fontRef idx="minor">
+              <a:schemeClr val="lt1"/>
+            </a:fontRef>
+          </p:style>
+          <p:txBody>
+            <a:bodyPr rtlCol="0" anchor="ctr"/>
+            <a:lstStyle/>
+            <a:p>
+              <a:pPr algn="ctr"/>
+              <a:endParaRPr kumimoji="1" lang="ja-JP" altLang="en-US"/>
+            </a:p>
+          </p:txBody>
+        </p:sp>
+        <p:sp>
+          <p:nvSpPr>
+            <p:cNvPr id="37" name="円/楕円 36">
+              <a:extLst>
+                <a:ext uri="{FF2B5EF4-FFF2-40B4-BE49-F238E27FC236}">
+                  <a16:creationId xmlns:a16="http://schemas.microsoft.com/office/drawing/2014/main" id="{E215D789-EEAF-3540-9E6B-D5A9304419BA}"/>
+                </a:ext>
+              </a:extLst>
+            </p:cNvPr>
+            <p:cNvSpPr/>
+            <p:nvPr/>
+          </p:nvSpPr>
+          <p:spPr>
+            <a:xfrm>
+              <a:off x="3083172" y="454503"/>
+              <a:ext cx="72000" cy="73251"/>
+            </a:xfrm>
+            <a:prstGeom prst="ellipse">
+              <a:avLst/>
+            </a:prstGeom>
+            <a:solidFill>
+              <a:srgbClr val="FFFF00"/>
+            </a:solidFill>
+            <a:ln>
+              <a:solidFill>
+                <a:schemeClr val="tx1"/>
+              </a:solidFill>
+            </a:ln>
+          </p:spPr>
+          <p:style>
+            <a:lnRef idx="2">
+              <a:schemeClr val="accent1">
+                <a:shade val="50000"/>
+              </a:schemeClr>
+            </a:lnRef>
+            <a:fillRef idx="1">
+              <a:schemeClr val="accent1"/>
+            </a:fillRef>
+            <a:effectRef idx="0">
+              <a:schemeClr val="accent1"/>
+            </a:effectRef>
+            <a:fontRef idx="minor">
+              <a:schemeClr val="lt1"/>
+            </a:fontRef>
+          </p:style>
+          <p:txBody>
+            <a:bodyPr rtlCol="0" anchor="ctr"/>
+            <a:lstStyle/>
+            <a:p>
+              <a:pPr algn="ctr"/>
+              <a:endParaRPr kumimoji="1" lang="ja-JP" altLang="en-US"/>
+            </a:p>
+          </p:txBody>
+        </p:sp>
+        <p:sp>
+          <p:nvSpPr>
+            <p:cNvPr id="42" name="正方形/長方形 41">
+              <a:extLst>
+                <a:ext uri="{FF2B5EF4-FFF2-40B4-BE49-F238E27FC236}">
+                  <a16:creationId xmlns:a16="http://schemas.microsoft.com/office/drawing/2014/main" id="{FCCC289A-DE8D-CE4E-89C0-A56AC1DD97DB}"/>
+                </a:ext>
+              </a:extLst>
+            </p:cNvPr>
+            <p:cNvSpPr/>
+            <p:nvPr/>
+          </p:nvSpPr>
+          <p:spPr>
+            <a:xfrm>
+              <a:off x="3216628" y="682319"/>
+              <a:ext cx="72000" cy="73251"/>
+            </a:xfrm>
+            <a:prstGeom prst="rect">
+              <a:avLst/>
+            </a:prstGeom>
+            <a:solidFill>
+              <a:schemeClr val="accent1"/>
+            </a:solidFill>
+            <a:ln>
+              <a:solidFill>
+                <a:schemeClr val="tx1"/>
+              </a:solidFill>
+            </a:ln>
+          </p:spPr>
+          <p:style>
+            <a:lnRef idx="2">
+              <a:schemeClr val="accent1">
+                <a:shade val="50000"/>
+              </a:schemeClr>
+            </a:lnRef>
+            <a:fillRef idx="1">
+              <a:schemeClr val="accent1"/>
+            </a:fillRef>
+            <a:effectRef idx="0">
+              <a:schemeClr val="accent1"/>
+            </a:effectRef>
+            <a:fontRef idx="minor">
+              <a:schemeClr val="lt1"/>
+            </a:fontRef>
+          </p:style>
+          <p:txBody>
+            <a:bodyPr rtlCol="0" anchor="ctr"/>
+            <a:lstStyle/>
+            <a:p>
+              <a:pPr algn="ctr"/>
+              <a:endParaRPr kumimoji="1" lang="ja-JP" altLang="en-US"/>
+            </a:p>
+          </p:txBody>
+        </p:sp>
+        <p:sp>
+          <p:nvSpPr>
+            <p:cNvPr id="43" name="円/楕円 42">
+              <a:extLst>
+                <a:ext uri="{FF2B5EF4-FFF2-40B4-BE49-F238E27FC236}">
+                  <a16:creationId xmlns:a16="http://schemas.microsoft.com/office/drawing/2014/main" id="{B3625F89-1B4A-0744-9CCE-955292F0FA75}"/>
+                </a:ext>
+              </a:extLst>
+            </p:cNvPr>
+            <p:cNvSpPr/>
+            <p:nvPr/>
+          </p:nvSpPr>
+          <p:spPr>
+            <a:xfrm>
+              <a:off x="3084410" y="682836"/>
+              <a:ext cx="72000" cy="73251"/>
+            </a:xfrm>
+            <a:prstGeom prst="ellipse">
+              <a:avLst/>
+            </a:prstGeom>
+            <a:solidFill>
+              <a:schemeClr val="accent6"/>
+            </a:solidFill>
+            <a:ln>
+              <a:solidFill>
+                <a:schemeClr val="tx1"/>
+              </a:solidFill>
+            </a:ln>
+          </p:spPr>
+          <p:style>
+            <a:lnRef idx="2">
+              <a:schemeClr val="accent1">
+                <a:shade val="50000"/>
+              </a:schemeClr>
+            </a:lnRef>
+            <a:fillRef idx="1">
+              <a:schemeClr val="accent1"/>
+            </a:fillRef>
+            <a:effectRef idx="0">
+              <a:schemeClr val="accent1"/>
+            </a:effectRef>
+            <a:fontRef idx="minor">
+              <a:schemeClr val="lt1"/>
+            </a:fontRef>
+          </p:style>
+          <p:txBody>
+            <a:bodyPr rtlCol="0" anchor="ctr"/>
+            <a:lstStyle/>
+            <a:p>
+              <a:pPr algn="ctr"/>
+              <a:endParaRPr kumimoji="1" lang="ja-JP" altLang="en-US"/>
+            </a:p>
+          </p:txBody>
+        </p:sp>
+      </p:grpSp>
     </p:spTree>
     <p:extLst>
       <p:ext uri="{BB962C8B-B14F-4D97-AF65-F5344CB8AC3E}">

</xml_diff>